<commit_message>
Tarea03 Presentacion error 111
</commit_message>
<xml_diff>
--- a/Tareas/Tarea 03/Presentacion avance Tarea3.pptx
+++ b/Tareas/Tarea 03/Presentacion avance Tarea3.pptx
@@ -10,6 +10,7 @@
     <p:sldId id="258" r:id="rId4"/>
     <p:sldId id="259" r:id="rId5"/>
     <p:sldId id="260" r:id="rId6"/>
+    <p:sldId id="261" r:id="rId7"/>
   </p:sldIdLst>
   <p:sldSz cx="12192000" cy="6858000"/>
   <p:notesSz cx="6858000" cy="9144000"/>
@@ -838,7 +839,7 @@
           <a:p>
             <a:fld id="{53827CBA-6856-41DC-8B7D-095D130DC70D}" type="datetimeFigureOut">
               <a:rPr lang="es-MX" smtClean="0"/>
-              <a:t>15/10/2024</a:t>
+              <a:t>16/10/2024</a:t>
             </a:fld>
             <a:endParaRPr lang="es-MX"/>
           </a:p>
@@ -1089,7 +1090,7 @@
           <a:p>
             <a:fld id="{53827CBA-6856-41DC-8B7D-095D130DC70D}" type="datetimeFigureOut">
               <a:rPr lang="es-MX" smtClean="0"/>
-              <a:t>15/10/2024</a:t>
+              <a:t>16/10/2024</a:t>
             </a:fld>
             <a:endParaRPr lang="es-MX"/>
           </a:p>
@@ -1403,7 +1404,7 @@
           <a:p>
             <a:fld id="{53827CBA-6856-41DC-8B7D-095D130DC70D}" type="datetimeFigureOut">
               <a:rPr lang="es-MX" smtClean="0"/>
-              <a:t>15/10/2024</a:t>
+              <a:t>16/10/2024</a:t>
             </a:fld>
             <a:endParaRPr lang="es-MX"/>
           </a:p>
@@ -1744,7 +1745,7 @@
           <a:p>
             <a:fld id="{53827CBA-6856-41DC-8B7D-095D130DC70D}" type="datetimeFigureOut">
               <a:rPr lang="es-MX" smtClean="0"/>
-              <a:t>15/10/2024</a:t>
+              <a:t>16/10/2024</a:t>
             </a:fld>
             <a:endParaRPr lang="es-MX"/>
           </a:p>
@@ -2058,7 +2059,7 @@
           <a:p>
             <a:fld id="{53827CBA-6856-41DC-8B7D-095D130DC70D}" type="datetimeFigureOut">
               <a:rPr lang="es-MX" smtClean="0"/>
-              <a:t>15/10/2024</a:t>
+              <a:t>16/10/2024</a:t>
             </a:fld>
             <a:endParaRPr lang="es-MX"/>
           </a:p>
@@ -2451,7 +2452,7 @@
           <a:p>
             <a:fld id="{53827CBA-6856-41DC-8B7D-095D130DC70D}" type="datetimeFigureOut">
               <a:rPr lang="es-MX" smtClean="0"/>
-              <a:t>15/10/2024</a:t>
+              <a:t>16/10/2024</a:t>
             </a:fld>
             <a:endParaRPr lang="es-MX"/>
           </a:p>
@@ -2621,7 +2622,7 @@
           <a:p>
             <a:fld id="{53827CBA-6856-41DC-8B7D-095D130DC70D}" type="datetimeFigureOut">
               <a:rPr lang="es-MX" smtClean="0"/>
-              <a:t>15/10/2024</a:t>
+              <a:t>16/10/2024</a:t>
             </a:fld>
             <a:endParaRPr lang="es-MX"/>
           </a:p>
@@ -2801,7 +2802,7 @@
           <a:p>
             <a:fld id="{53827CBA-6856-41DC-8B7D-095D130DC70D}" type="datetimeFigureOut">
               <a:rPr lang="es-MX" smtClean="0"/>
-              <a:t>15/10/2024</a:t>
+              <a:t>16/10/2024</a:t>
             </a:fld>
             <a:endParaRPr lang="es-MX"/>
           </a:p>
@@ -2977,7 +2978,7 @@
           <a:p>
             <a:fld id="{53827CBA-6856-41DC-8B7D-095D130DC70D}" type="datetimeFigureOut">
               <a:rPr lang="es-MX" smtClean="0"/>
-              <a:t>15/10/2024</a:t>
+              <a:t>16/10/2024</a:t>
             </a:fld>
             <a:endParaRPr lang="es-MX"/>
           </a:p>
@@ -3224,7 +3225,7 @@
           <a:p>
             <a:fld id="{53827CBA-6856-41DC-8B7D-095D130DC70D}" type="datetimeFigureOut">
               <a:rPr lang="es-MX" smtClean="0"/>
-              <a:t>15/10/2024</a:t>
+              <a:t>16/10/2024</a:t>
             </a:fld>
             <a:endParaRPr lang="es-MX"/>
           </a:p>
@@ -3456,7 +3457,7 @@
           <a:p>
             <a:fld id="{53827CBA-6856-41DC-8B7D-095D130DC70D}" type="datetimeFigureOut">
               <a:rPr lang="es-MX" smtClean="0"/>
-              <a:t>15/10/2024</a:t>
+              <a:t>16/10/2024</a:t>
             </a:fld>
             <a:endParaRPr lang="es-MX"/>
           </a:p>
@@ -3830,7 +3831,7 @@
           <a:p>
             <a:fld id="{53827CBA-6856-41DC-8B7D-095D130DC70D}" type="datetimeFigureOut">
               <a:rPr lang="es-MX" smtClean="0"/>
-              <a:t>15/10/2024</a:t>
+              <a:t>16/10/2024</a:t>
             </a:fld>
             <a:endParaRPr lang="es-MX"/>
           </a:p>
@@ -3953,7 +3954,7 @@
           <a:p>
             <a:fld id="{53827CBA-6856-41DC-8B7D-095D130DC70D}" type="datetimeFigureOut">
               <a:rPr lang="es-MX" smtClean="0"/>
-              <a:t>15/10/2024</a:t>
+              <a:t>16/10/2024</a:t>
             </a:fld>
             <a:endParaRPr lang="es-MX"/>
           </a:p>
@@ -4048,7 +4049,7 @@
           <a:p>
             <a:fld id="{53827CBA-6856-41DC-8B7D-095D130DC70D}" type="datetimeFigureOut">
               <a:rPr lang="es-MX" smtClean="0"/>
-              <a:t>15/10/2024</a:t>
+              <a:t>16/10/2024</a:t>
             </a:fld>
             <a:endParaRPr lang="es-MX"/>
           </a:p>
@@ -4303,7 +4304,7 @@
           <a:p>
             <a:fld id="{53827CBA-6856-41DC-8B7D-095D130DC70D}" type="datetimeFigureOut">
               <a:rPr lang="es-MX" smtClean="0"/>
-              <a:t>15/10/2024</a:t>
+              <a:t>16/10/2024</a:t>
             </a:fld>
             <a:endParaRPr lang="es-MX"/>
           </a:p>
@@ -4566,7 +4567,7 @@
           <a:p>
             <a:fld id="{53827CBA-6856-41DC-8B7D-095D130DC70D}" type="datetimeFigureOut">
               <a:rPr lang="es-MX" smtClean="0"/>
-              <a:t>15/10/2024</a:t>
+              <a:t>16/10/2024</a:t>
             </a:fld>
             <a:endParaRPr lang="es-MX"/>
           </a:p>
@@ -5309,7 +5310,7 @@
           <a:p>
             <a:fld id="{53827CBA-6856-41DC-8B7D-095D130DC70D}" type="datetimeFigureOut">
               <a:rPr lang="es-MX" smtClean="0"/>
-              <a:t>15/10/2024</a:t>
+              <a:t>16/10/2024</a:t>
             </a:fld>
             <a:endParaRPr lang="es-MX"/>
           </a:p>
@@ -5897,35 +5898,55 @@
           <a:p>
             <a:pPr algn="l"/>
             <a:r>
-              <a:rPr lang="es-MX" sz="2400" dirty="0"/>
+              <a:rPr lang="es-MX" sz="2400" dirty="0">
+                <a:solidFill>
+                  <a:schemeClr val="tx1"/>
+                </a:solidFill>
+              </a:rPr>
               <a:t>Datos Masivos</a:t>
             </a:r>
           </a:p>
           <a:p>
             <a:pPr algn="l"/>
             <a:r>
-              <a:rPr lang="es-MX" sz="2400" dirty="0"/>
+              <a:rPr lang="es-MX" sz="2400" dirty="0">
+                <a:solidFill>
+                  <a:schemeClr val="tx1"/>
+                </a:solidFill>
+              </a:rPr>
               <a:t>Tarea 3</a:t>
             </a:r>
           </a:p>
           <a:p>
             <a:pPr algn="l"/>
             <a:r>
-              <a:rPr lang="es-MX" sz="2400" dirty="0"/>
+              <a:rPr lang="es-MX" sz="2400" dirty="0">
+                <a:solidFill>
+                  <a:schemeClr val="tx1"/>
+                </a:solidFill>
+              </a:rPr>
               <a:t>Profesor: José Alberto Benavides Vázquez</a:t>
             </a:r>
           </a:p>
           <a:p>
             <a:pPr algn="l"/>
             <a:r>
-              <a:rPr lang="es-MX" sz="2400" dirty="0"/>
+              <a:rPr lang="es-MX" sz="2400" dirty="0">
+                <a:solidFill>
+                  <a:schemeClr val="tx1"/>
+                </a:solidFill>
+              </a:rPr>
               <a:t>Alumno: José Andree Flores Guerrero</a:t>
             </a:r>
           </a:p>
           <a:p>
             <a:pPr algn="l"/>
             <a:r>
-              <a:rPr lang="es-MX" sz="2400" dirty="0"/>
+              <a:rPr lang="es-MX" sz="2400" dirty="0">
+                <a:solidFill>
+                  <a:schemeClr val="tx1"/>
+                </a:solidFill>
+              </a:rPr>
               <a:t>Matrícula 1848962</a:t>
             </a:r>
           </a:p>
@@ -6875,6 +6896,389 @@
     <p:extLst>
       <p:ext uri="{BB962C8B-B14F-4D97-AF65-F5344CB8AC3E}">
         <p14:creationId xmlns:p14="http://schemas.microsoft.com/office/powerpoint/2010/main" val="1399215104"/>
+      </p:ext>
+    </p:extLst>
+  </p:cSld>
+  <p:clrMapOvr>
+    <a:masterClrMapping/>
+  </p:clrMapOvr>
+</p:sld>
+</file>
+
+<file path=ppt/slides/slide6.xml><?xml version="1.0" encoding="utf-8"?>
+<p:sld xmlns:a="http://schemas.openxmlformats.org/drawingml/2006/main" xmlns:r="http://schemas.openxmlformats.org/officeDocument/2006/relationships" xmlns:p="http://schemas.openxmlformats.org/presentationml/2006/main">
+  <p:cSld>
+    <p:spTree>
+      <p:nvGrpSpPr>
+        <p:cNvPr id="1" name=""/>
+        <p:cNvGrpSpPr/>
+        <p:nvPr/>
+      </p:nvGrpSpPr>
+      <p:grpSpPr>
+        <a:xfrm>
+          <a:off x="0" y="0"/>
+          <a:ext cx="0" cy="0"/>
+          <a:chOff x="0" y="0"/>
+          <a:chExt cx="0" cy="0"/>
+        </a:xfrm>
+      </p:grpSpPr>
+      <p:sp>
+        <p:nvSpPr>
+          <p:cNvPr id="2" name="Title 1">
+            <a:extLst>
+              <a:ext uri="{FF2B5EF4-FFF2-40B4-BE49-F238E27FC236}">
+                <a16:creationId xmlns:a16="http://schemas.microsoft.com/office/drawing/2014/main" id="{6B736F58-4D73-2236-6013-2BADD3A03979}"/>
+              </a:ext>
+            </a:extLst>
+          </p:cNvPr>
+          <p:cNvSpPr>
+            <a:spLocks noGrp="1"/>
+          </p:cNvSpPr>
+          <p:nvPr>
+            <p:ph type="title"/>
+          </p:nvPr>
+        </p:nvSpPr>
+        <p:spPr/>
+        <p:txBody>
+          <a:bodyPr/>
+          <a:lstStyle/>
+          <a:p>
+            <a:r>
+              <a:rPr lang="es-MX" dirty="0"/>
+              <a:t>Soluciones al problema</a:t>
+            </a:r>
+          </a:p>
+        </p:txBody>
+      </p:sp>
+      <p:sp>
+        <p:nvSpPr>
+          <p:cNvPr id="3" name="Content Placeholder 2">
+            <a:extLst>
+              <a:ext uri="{FF2B5EF4-FFF2-40B4-BE49-F238E27FC236}">
+                <a16:creationId xmlns:a16="http://schemas.microsoft.com/office/drawing/2014/main" id="{7FCDE597-E748-7AB0-DB2B-5566836EBC02}"/>
+              </a:ext>
+            </a:extLst>
+          </p:cNvPr>
+          <p:cNvSpPr>
+            <a:spLocks noGrp="1"/>
+          </p:cNvSpPr>
+          <p:nvPr>
+            <p:ph idx="1"/>
+          </p:nvPr>
+        </p:nvSpPr>
+        <p:spPr>
+          <a:xfrm>
+            <a:off x="677334" y="2160589"/>
+            <a:ext cx="8596668" cy="557211"/>
+          </a:xfrm>
+        </p:spPr>
+        <p:txBody>
+          <a:bodyPr/>
+          <a:lstStyle/>
+          <a:p>
+            <a:r>
+              <a:rPr lang="es-MX" dirty="0"/>
+              <a:t>El error 111 para estar relacionado a este mensaje:</a:t>
+            </a:r>
+          </a:p>
+        </p:txBody>
+      </p:sp>
+      <p:pic>
+        <p:nvPicPr>
+          <p:cNvPr id="5" name="Picture 4">
+            <a:extLst>
+              <a:ext uri="{FF2B5EF4-FFF2-40B4-BE49-F238E27FC236}">
+                <a16:creationId xmlns:a16="http://schemas.microsoft.com/office/drawing/2014/main" id="{803AF7A7-92E5-3C1C-9AF1-F97360DABDAF}"/>
+              </a:ext>
+            </a:extLst>
+          </p:cNvPr>
+          <p:cNvPicPr>
+            <a:picLocks noChangeAspect="1"/>
+          </p:cNvPicPr>
+          <p:nvPr/>
+        </p:nvPicPr>
+        <p:blipFill>
+          <a:blip r:embed="rId2"/>
+          <a:stretch>
+            <a:fillRect/>
+          </a:stretch>
+        </p:blipFill>
+        <p:spPr>
+          <a:xfrm>
+            <a:off x="280356" y="2947989"/>
+            <a:ext cx="11631287" cy="421745"/>
+          </a:xfrm>
+          <a:prstGeom prst="rect">
+            <a:avLst/>
+          </a:prstGeom>
+        </p:spPr>
+      </p:pic>
+      <p:sp>
+        <p:nvSpPr>
+          <p:cNvPr id="6" name="Content Placeholder 2">
+            <a:extLst>
+              <a:ext uri="{FF2B5EF4-FFF2-40B4-BE49-F238E27FC236}">
+                <a16:creationId xmlns:a16="http://schemas.microsoft.com/office/drawing/2014/main" id="{8A233F6C-6202-38A5-BC5F-E3DDAAF427EE}"/>
+              </a:ext>
+            </a:extLst>
+          </p:cNvPr>
+          <p:cNvSpPr txBox="1">
+            <a:spLocks/>
+          </p:cNvSpPr>
+          <p:nvPr/>
+        </p:nvSpPr>
+        <p:spPr>
+          <a:xfrm>
+            <a:off x="677334" y="3830112"/>
+            <a:ext cx="8596668" cy="557211"/>
+          </a:xfrm>
+          <a:prstGeom prst="rect">
+            <a:avLst/>
+          </a:prstGeom>
+        </p:spPr>
+        <p:txBody>
+          <a:bodyPr vert="horz" lIns="91440" tIns="45720" rIns="91440" bIns="45720" rtlCol="0">
+            <a:normAutofit/>
+          </a:bodyPr>
+          <a:lstStyle>
+            <a:lvl1pPr marL="342900" indent="-342900" algn="l" defTabSz="457200" rtl="0" eaLnBrk="1" latinLnBrk="0" hangingPunct="1">
+              <a:spcBef>
+                <a:spcPts val="1000"/>
+              </a:spcBef>
+              <a:spcAft>
+                <a:spcPts val="0"/>
+              </a:spcAft>
+              <a:buClr>
+                <a:schemeClr val="accent1"/>
+              </a:buClr>
+              <a:buSzPct val="80000"/>
+              <a:buFont typeface="Wingdings 3" charset="2"/>
+              <a:buChar char=""/>
+              <a:defRPr sz="1800" kern="1200">
+                <a:solidFill>
+                  <a:schemeClr val="tx1">
+                    <a:lumMod val="75000"/>
+                    <a:lumOff val="25000"/>
+                  </a:schemeClr>
+                </a:solidFill>
+                <a:latin typeface="+mn-lt"/>
+                <a:ea typeface="+mn-ea"/>
+                <a:cs typeface="+mn-cs"/>
+              </a:defRPr>
+            </a:lvl1pPr>
+            <a:lvl2pPr marL="742950" indent="-285750" algn="l" defTabSz="457200" rtl="0" eaLnBrk="1" latinLnBrk="0" hangingPunct="1">
+              <a:spcBef>
+                <a:spcPts val="1000"/>
+              </a:spcBef>
+              <a:spcAft>
+                <a:spcPts val="0"/>
+              </a:spcAft>
+              <a:buClr>
+                <a:schemeClr val="accent1"/>
+              </a:buClr>
+              <a:buSzPct val="80000"/>
+              <a:buFont typeface="Wingdings 3" charset="2"/>
+              <a:buChar char=""/>
+              <a:defRPr sz="1600" kern="1200">
+                <a:solidFill>
+                  <a:schemeClr val="tx1">
+                    <a:lumMod val="75000"/>
+                    <a:lumOff val="25000"/>
+                  </a:schemeClr>
+                </a:solidFill>
+                <a:latin typeface="+mn-lt"/>
+                <a:ea typeface="+mn-ea"/>
+                <a:cs typeface="+mn-cs"/>
+              </a:defRPr>
+            </a:lvl2pPr>
+            <a:lvl3pPr marL="1143000" indent="-228600" algn="l" defTabSz="457200" rtl="0" eaLnBrk="1" latinLnBrk="0" hangingPunct="1">
+              <a:spcBef>
+                <a:spcPts val="1000"/>
+              </a:spcBef>
+              <a:spcAft>
+                <a:spcPts val="0"/>
+              </a:spcAft>
+              <a:buClr>
+                <a:schemeClr val="accent1"/>
+              </a:buClr>
+              <a:buSzPct val="80000"/>
+              <a:buFont typeface="Wingdings 3" charset="2"/>
+              <a:buChar char=""/>
+              <a:defRPr sz="1400" kern="1200">
+                <a:solidFill>
+                  <a:schemeClr val="tx1">
+                    <a:lumMod val="75000"/>
+                    <a:lumOff val="25000"/>
+                  </a:schemeClr>
+                </a:solidFill>
+                <a:latin typeface="+mn-lt"/>
+                <a:ea typeface="+mn-ea"/>
+                <a:cs typeface="+mn-cs"/>
+              </a:defRPr>
+            </a:lvl3pPr>
+            <a:lvl4pPr marL="1600200" indent="-228600" algn="l" defTabSz="457200" rtl="0" eaLnBrk="1" latinLnBrk="0" hangingPunct="1">
+              <a:spcBef>
+                <a:spcPts val="1000"/>
+              </a:spcBef>
+              <a:spcAft>
+                <a:spcPts val="0"/>
+              </a:spcAft>
+              <a:buClr>
+                <a:schemeClr val="accent1"/>
+              </a:buClr>
+              <a:buSzPct val="80000"/>
+              <a:buFont typeface="Wingdings 3" charset="2"/>
+              <a:buChar char=""/>
+              <a:defRPr sz="1200" kern="1200">
+                <a:solidFill>
+                  <a:schemeClr val="tx1">
+                    <a:lumMod val="75000"/>
+                    <a:lumOff val="25000"/>
+                  </a:schemeClr>
+                </a:solidFill>
+                <a:latin typeface="+mn-lt"/>
+                <a:ea typeface="+mn-ea"/>
+                <a:cs typeface="+mn-cs"/>
+              </a:defRPr>
+            </a:lvl4pPr>
+            <a:lvl5pPr marL="2057400" indent="-228600" algn="l" defTabSz="457200" rtl="0" eaLnBrk="1" latinLnBrk="0" hangingPunct="1">
+              <a:spcBef>
+                <a:spcPts val="1000"/>
+              </a:spcBef>
+              <a:spcAft>
+                <a:spcPts val="0"/>
+              </a:spcAft>
+              <a:buClr>
+                <a:schemeClr val="accent1"/>
+              </a:buClr>
+              <a:buSzPct val="80000"/>
+              <a:buFont typeface="Wingdings 3" charset="2"/>
+              <a:buChar char=""/>
+              <a:defRPr sz="1200" kern="1200">
+                <a:solidFill>
+                  <a:schemeClr val="tx1">
+                    <a:lumMod val="75000"/>
+                    <a:lumOff val="25000"/>
+                  </a:schemeClr>
+                </a:solidFill>
+                <a:latin typeface="+mn-lt"/>
+                <a:ea typeface="+mn-ea"/>
+                <a:cs typeface="+mn-cs"/>
+              </a:defRPr>
+            </a:lvl5pPr>
+            <a:lvl6pPr marL="2514600" indent="-228600" algn="l" defTabSz="457200" rtl="0" eaLnBrk="1" latinLnBrk="0" hangingPunct="1">
+              <a:spcBef>
+                <a:spcPts val="1000"/>
+              </a:spcBef>
+              <a:spcAft>
+                <a:spcPts val="0"/>
+              </a:spcAft>
+              <a:buClr>
+                <a:schemeClr val="accent1"/>
+              </a:buClr>
+              <a:buSzPct val="80000"/>
+              <a:buFont typeface="Wingdings 3" charset="2"/>
+              <a:buChar char=""/>
+              <a:defRPr sz="1200" kern="1200">
+                <a:solidFill>
+                  <a:schemeClr val="tx1">
+                    <a:lumMod val="75000"/>
+                    <a:lumOff val="25000"/>
+                  </a:schemeClr>
+                </a:solidFill>
+                <a:latin typeface="+mn-lt"/>
+                <a:ea typeface="+mn-ea"/>
+                <a:cs typeface="+mn-cs"/>
+              </a:defRPr>
+            </a:lvl6pPr>
+            <a:lvl7pPr marL="2971800" indent="-228600" algn="l" defTabSz="457200" rtl="0" eaLnBrk="1" latinLnBrk="0" hangingPunct="1">
+              <a:spcBef>
+                <a:spcPts val="1000"/>
+              </a:spcBef>
+              <a:spcAft>
+                <a:spcPts val="0"/>
+              </a:spcAft>
+              <a:buClr>
+                <a:schemeClr val="accent1"/>
+              </a:buClr>
+              <a:buSzPct val="80000"/>
+              <a:buFont typeface="Wingdings 3" charset="2"/>
+              <a:buChar char=""/>
+              <a:defRPr sz="1200" kern="1200">
+                <a:solidFill>
+                  <a:schemeClr val="tx1">
+                    <a:lumMod val="75000"/>
+                    <a:lumOff val="25000"/>
+                  </a:schemeClr>
+                </a:solidFill>
+                <a:latin typeface="+mn-lt"/>
+                <a:ea typeface="+mn-ea"/>
+                <a:cs typeface="+mn-cs"/>
+              </a:defRPr>
+            </a:lvl7pPr>
+            <a:lvl8pPr marL="3429000" indent="-228600" algn="l" defTabSz="457200" rtl="0" eaLnBrk="1" latinLnBrk="0" hangingPunct="1">
+              <a:spcBef>
+                <a:spcPts val="1000"/>
+              </a:spcBef>
+              <a:spcAft>
+                <a:spcPts val="0"/>
+              </a:spcAft>
+              <a:buClr>
+                <a:schemeClr val="accent1"/>
+              </a:buClr>
+              <a:buSzPct val="80000"/>
+              <a:buFont typeface="Wingdings 3" charset="2"/>
+              <a:buChar char=""/>
+              <a:defRPr sz="1200" kern="1200">
+                <a:solidFill>
+                  <a:schemeClr val="tx1">
+                    <a:lumMod val="75000"/>
+                    <a:lumOff val="25000"/>
+                  </a:schemeClr>
+                </a:solidFill>
+                <a:latin typeface="+mn-lt"/>
+                <a:ea typeface="+mn-ea"/>
+                <a:cs typeface="+mn-cs"/>
+              </a:defRPr>
+            </a:lvl8pPr>
+            <a:lvl9pPr marL="3886200" indent="-228600" algn="l" defTabSz="457200" rtl="0" eaLnBrk="1" latinLnBrk="0" hangingPunct="1">
+              <a:spcBef>
+                <a:spcPts val="1000"/>
+              </a:spcBef>
+              <a:spcAft>
+                <a:spcPts val="0"/>
+              </a:spcAft>
+              <a:buClr>
+                <a:schemeClr val="accent1"/>
+              </a:buClr>
+              <a:buSzPct val="80000"/>
+              <a:buFont typeface="Wingdings 3" charset="2"/>
+              <a:buChar char=""/>
+              <a:defRPr sz="1200" kern="1200">
+                <a:solidFill>
+                  <a:schemeClr val="tx1">
+                    <a:lumMod val="75000"/>
+                    <a:lumOff val="25000"/>
+                  </a:schemeClr>
+                </a:solidFill>
+                <a:latin typeface="+mn-lt"/>
+                <a:ea typeface="+mn-ea"/>
+                <a:cs typeface="+mn-cs"/>
+              </a:defRPr>
+            </a:lvl9pPr>
+          </a:lstStyle>
+          <a:p>
+            <a:r>
+              <a:rPr lang="es-MX" dirty="0"/>
+              <a:t>Aun no encuentro la forma de asignar el valor a SPARK_LOCAL_IP.</a:t>
+            </a:r>
+          </a:p>
+        </p:txBody>
+      </p:sp>
+    </p:spTree>
+    <p:extLst>
+      <p:ext uri="{BB962C8B-B14F-4D97-AF65-F5344CB8AC3E}">
+        <p14:creationId xmlns:p14="http://schemas.microsoft.com/office/powerpoint/2010/main" val="3567002940"/>
       </p:ext>
     </p:extLst>
   </p:cSld>

</xml_diff>